<commit_message>
Fine presentazione e bug fix
</commit_message>
<xml_diff>
--- a/Presentazione.pptx
+++ b/Presentazione.pptx
@@ -6,11 +6,13 @@
   </p:sldMasterIdLst>
   <p:sldIdLst>
     <p:sldId id="256" r:id="rId2"/>
-    <p:sldId id="257" r:id="rId3"/>
-    <p:sldId id="258" r:id="rId4"/>
-    <p:sldId id="259" r:id="rId5"/>
+    <p:sldId id="258" r:id="rId3"/>
+    <p:sldId id="259" r:id="rId4"/>
+    <p:sldId id="262" r:id="rId5"/>
     <p:sldId id="260" r:id="rId6"/>
-    <p:sldId id="261" r:id="rId7"/>
+    <p:sldId id="263" r:id="rId7"/>
+    <p:sldId id="264" r:id="rId8"/>
+    <p:sldId id="265" r:id="rId9"/>
   </p:sldIdLst>
   <p:sldSz cx="12192000" cy="6858000"/>
   <p:notesSz cx="6858000" cy="9144000"/>
@@ -308,7 +310,7 @@
           <a:p>
             <a:fld id="{CD6C1E8B-655C-4EEC-B58E-4ED2930057F4}" type="datetimeFigureOut">
               <a:rPr lang="it-IT" smtClean="0"/>
-              <a:t>15/01/2023</a:t>
+              <a:t>16/01/2023</a:t>
             </a:fld>
             <a:endParaRPr lang="it-IT"/>
           </a:p>
@@ -744,7 +746,7 @@
           <a:p>
             <a:fld id="{CD6C1E8B-655C-4EEC-B58E-4ED2930057F4}" type="datetimeFigureOut">
               <a:rPr lang="it-IT" smtClean="0"/>
-              <a:t>15/01/2023</a:t>
+              <a:t>16/01/2023</a:t>
             </a:fld>
             <a:endParaRPr lang="it-IT"/>
           </a:p>
@@ -994,7 +996,7 @@
           <a:p>
             <a:fld id="{CD6C1E8B-655C-4EEC-B58E-4ED2930057F4}" type="datetimeFigureOut">
               <a:rPr lang="it-IT" smtClean="0"/>
-              <a:t>15/01/2023</a:t>
+              <a:t>16/01/2023</a:t>
             </a:fld>
             <a:endParaRPr lang="it-IT"/>
           </a:p>
@@ -1302,7 +1304,7 @@
           <a:p>
             <a:fld id="{CD6C1E8B-655C-4EEC-B58E-4ED2930057F4}" type="datetimeFigureOut">
               <a:rPr lang="it-IT" smtClean="0"/>
-              <a:t>15/01/2023</a:t>
+              <a:t>16/01/2023</a:t>
             </a:fld>
             <a:endParaRPr lang="it-IT"/>
           </a:p>
@@ -1620,7 +1622,7 @@
           <a:p>
             <a:fld id="{CD6C1E8B-655C-4EEC-B58E-4ED2930057F4}" type="datetimeFigureOut">
               <a:rPr lang="it-IT" smtClean="0"/>
-              <a:t>15/01/2023</a:t>
+              <a:t>16/01/2023</a:t>
             </a:fld>
             <a:endParaRPr lang="it-IT"/>
           </a:p>
@@ -1922,7 +1924,7 @@
           <a:p>
             <a:fld id="{CD6C1E8B-655C-4EEC-B58E-4ED2930057F4}" type="datetimeFigureOut">
               <a:rPr lang="it-IT" smtClean="0"/>
-              <a:t>15/01/2023</a:t>
+              <a:t>16/01/2023</a:t>
             </a:fld>
             <a:endParaRPr lang="it-IT"/>
           </a:p>
@@ -2289,7 +2291,7 @@
           <a:p>
             <a:fld id="{CD6C1E8B-655C-4EEC-B58E-4ED2930057F4}" type="datetimeFigureOut">
               <a:rPr lang="it-IT" smtClean="0"/>
-              <a:t>15/01/2023</a:t>
+              <a:t>16/01/2023</a:t>
             </a:fld>
             <a:endParaRPr lang="it-IT"/>
           </a:p>
@@ -2463,7 +2465,7 @@
           <a:p>
             <a:fld id="{CD6C1E8B-655C-4EEC-B58E-4ED2930057F4}" type="datetimeFigureOut">
               <a:rPr lang="it-IT" smtClean="0"/>
-              <a:t>15/01/2023</a:t>
+              <a:t>16/01/2023</a:t>
             </a:fld>
             <a:endParaRPr lang="it-IT"/>
           </a:p>
@@ -2643,7 +2645,7 @@
           <a:p>
             <a:fld id="{CD6C1E8B-655C-4EEC-B58E-4ED2930057F4}" type="datetimeFigureOut">
               <a:rPr lang="it-IT" smtClean="0"/>
-              <a:t>15/01/2023</a:t>
+              <a:t>16/01/2023</a:t>
             </a:fld>
             <a:endParaRPr lang="it-IT"/>
           </a:p>
@@ -2813,7 +2815,7 @@
           <a:p>
             <a:fld id="{CD6C1E8B-655C-4EEC-B58E-4ED2930057F4}" type="datetimeFigureOut">
               <a:rPr lang="it-IT" smtClean="0"/>
-              <a:t>15/01/2023</a:t>
+              <a:t>16/01/2023</a:t>
             </a:fld>
             <a:endParaRPr lang="it-IT"/>
           </a:p>
@@ -3063,7 +3065,7 @@
           <a:p>
             <a:fld id="{CD6C1E8B-655C-4EEC-B58E-4ED2930057F4}" type="datetimeFigureOut">
               <a:rPr lang="it-IT" smtClean="0"/>
-              <a:t>15/01/2023</a:t>
+              <a:t>16/01/2023</a:t>
             </a:fld>
             <a:endParaRPr lang="it-IT"/>
           </a:p>
@@ -3299,7 +3301,7 @@
           <a:p>
             <a:fld id="{CD6C1E8B-655C-4EEC-B58E-4ED2930057F4}" type="datetimeFigureOut">
               <a:rPr lang="it-IT" smtClean="0"/>
-              <a:t>15/01/2023</a:t>
+              <a:t>16/01/2023</a:t>
             </a:fld>
             <a:endParaRPr lang="it-IT"/>
           </a:p>
@@ -3681,7 +3683,7 @@
           <a:p>
             <a:fld id="{CD6C1E8B-655C-4EEC-B58E-4ED2930057F4}" type="datetimeFigureOut">
               <a:rPr lang="it-IT" smtClean="0"/>
-              <a:t>15/01/2023</a:t>
+              <a:t>16/01/2023</a:t>
             </a:fld>
             <a:endParaRPr lang="it-IT"/>
           </a:p>
@@ -3799,7 +3801,7 @@
           <a:p>
             <a:fld id="{CD6C1E8B-655C-4EEC-B58E-4ED2930057F4}" type="datetimeFigureOut">
               <a:rPr lang="it-IT" smtClean="0"/>
-              <a:t>15/01/2023</a:t>
+              <a:t>16/01/2023</a:t>
             </a:fld>
             <a:endParaRPr lang="it-IT"/>
           </a:p>
@@ -3894,7 +3896,7 @@
           <a:p>
             <a:fld id="{CD6C1E8B-655C-4EEC-B58E-4ED2930057F4}" type="datetimeFigureOut">
               <a:rPr lang="it-IT" smtClean="0"/>
-              <a:t>15/01/2023</a:t>
+              <a:t>16/01/2023</a:t>
             </a:fld>
             <a:endParaRPr lang="it-IT"/>
           </a:p>
@@ -4149,7 +4151,7 @@
           <a:p>
             <a:fld id="{CD6C1E8B-655C-4EEC-B58E-4ED2930057F4}" type="datetimeFigureOut">
               <a:rPr lang="it-IT" smtClean="0"/>
-              <a:t>15/01/2023</a:t>
+              <a:t>16/01/2023</a:t>
             </a:fld>
             <a:endParaRPr lang="it-IT"/>
           </a:p>
@@ -4432,7 +4434,7 @@
           <a:p>
             <a:fld id="{CD6C1E8B-655C-4EEC-B58E-4ED2930057F4}" type="datetimeFigureOut">
               <a:rPr lang="it-IT" smtClean="0"/>
-              <a:t>15/01/2023</a:t>
+              <a:t>16/01/2023</a:t>
             </a:fld>
             <a:endParaRPr lang="it-IT"/>
           </a:p>
@@ -4838,7 +4840,7 @@
           <a:p>
             <a:fld id="{CD6C1E8B-655C-4EEC-B58E-4ED2930057F4}" type="datetimeFigureOut">
               <a:rPr lang="it-IT" smtClean="0"/>
-              <a:t>15/01/2023</a:t>
+              <a:t>16/01/2023</a:t>
             </a:fld>
             <a:endParaRPr lang="it-IT"/>
           </a:p>
@@ -5482,23 +5484,7 @@
           <a:p>
             <a:r>
               <a:rPr lang="it-IT" dirty="0" smtClean="0"/>
-              <a:t>Come funziona il </a:t>
-            </a:r>
-            <a:r>
-              <a:rPr lang="it-IT" dirty="0" err="1" smtClean="0"/>
-              <a:t>distance</a:t>
-            </a:r>
-            <a:r>
-              <a:rPr lang="it-IT" dirty="0" smtClean="0"/>
-              <a:t> </a:t>
-            </a:r>
-            <a:r>
-              <a:rPr lang="it-IT" dirty="0" err="1" smtClean="0"/>
-              <a:t>vector</a:t>
-            </a:r>
-            <a:r>
-              <a:rPr lang="it-IT" dirty="0" smtClean="0"/>
-              <a:t> routing?</a:t>
+              <a:t>Implementazione su java</a:t>
             </a:r>
             <a:endParaRPr lang="it-IT" dirty="0"/>
           </a:p>
@@ -5531,38 +5517,45 @@
             </a:pPr>
             <a:r>
               <a:rPr lang="it-IT" dirty="0" smtClean="0"/>
-              <a:t>Il </a:t>
+              <a:t>Per creare l’algoritmo su java, ho utilizzato tre tabelle (matrici):</a:t>
+            </a:r>
+          </a:p>
+          <a:p>
+            <a:pPr>
+              <a:buFontTx/>
+              <a:buChar char="-"/>
+            </a:pPr>
+            <a:r>
+              <a:rPr lang="it-IT" dirty="0" smtClean="0"/>
+              <a:t>La tabella </a:t>
             </a:r>
             <a:r>
               <a:rPr lang="it-IT" dirty="0" err="1" smtClean="0"/>
-              <a:t>distance</a:t>
+              <a:t>orginale</a:t>
             </a:r>
             <a:r>
               <a:rPr lang="it-IT" dirty="0" smtClean="0"/>
-              <a:t> </a:t>
-            </a:r>
-            <a:r>
-              <a:rPr lang="it-IT" dirty="0" err="1" smtClean="0"/>
-              <a:t>vector</a:t>
-            </a:r>
+              <a:t>, creata con i dati inseriti dall’utente</a:t>
+            </a:r>
+          </a:p>
+          <a:p>
+            <a:pPr>
+              <a:buFontTx/>
+              <a:buChar char="-"/>
+            </a:pPr>
             <a:r>
               <a:rPr lang="it-IT" dirty="0" smtClean="0"/>
-              <a:t> routing è un algoritmo di routing dinamico che trova il percorso più breve tra i router utilizzando una tabella contente il nodo, il costo e l’interfaccia da utilizzare per raggiungere la destinazione.</a:t>
-            </a:r>
-          </a:p>
-          <a:p>
-            <a:pPr marL="0" indent="0">
-              <a:buNone/>
+              <a:t>La tabella intermedia, dove verranno eseguiti i calcoli sui collegamenti</a:t>
+            </a:r>
+          </a:p>
+          <a:p>
+            <a:pPr>
+              <a:buFontTx/>
+              <a:buChar char="-"/>
             </a:pPr>
-            <a:endParaRPr lang="it-IT" dirty="0"/>
-          </a:p>
-          <a:p>
-            <a:pPr marL="0" indent="0">
-              <a:buNone/>
-            </a:pPr>
             <a:r>
               <a:rPr lang="it-IT" dirty="0" smtClean="0"/>
-              <a:t>I router vicini si scambiano un vettore contente le distanze tra loro e gli altri router, in modo che tutti i router possano utilizzare il percorso più breve per raggiungere ogni altro router.</a:t>
+              <a:t>La tabella finale, contente il risultato finale che verrà mostrato all’utente</a:t>
             </a:r>
           </a:p>
         </p:txBody>
@@ -5570,7 +5563,7 @@
     </p:spTree>
     <p:extLst>
       <p:ext uri="{BB962C8B-B14F-4D97-AF65-F5344CB8AC3E}">
-        <p14:creationId xmlns:p14="http://schemas.microsoft.com/office/powerpoint/2010/main" val="4042436193"/>
+        <p14:creationId xmlns:p14="http://schemas.microsoft.com/office/powerpoint/2010/main" val="2625129020"/>
       </p:ext>
     </p:extLst>
   </p:cSld>
@@ -5626,7 +5619,7 @@
           <a:p>
             <a:r>
               <a:rPr lang="it-IT" dirty="0" smtClean="0"/>
-              <a:t>Implementazione su java</a:t>
+              <a:t>La tabella originale</a:t>
             </a:r>
             <a:endParaRPr lang="it-IT" dirty="0"/>
           </a:p>
@@ -5659,7 +5652,21 @@
             </a:pPr>
             <a:r>
               <a:rPr lang="it-IT" dirty="0" smtClean="0"/>
-              <a:t>Per creare l’algoritmo su java, ho utilizzato tre tabelle (matrici):</a:t>
+              <a:t>Per creare la prima tabella occorre </a:t>
+            </a:r>
+            <a:r>
+              <a:rPr lang="it-IT" dirty="0" smtClean="0"/>
+              <a:t>caricare da un file esterno i collegamenti tra i vari nodi:</a:t>
+            </a:r>
+            <a:endParaRPr lang="it-IT" dirty="0" smtClean="0"/>
+          </a:p>
+          <a:p>
+            <a:pPr marL="0" indent="0">
+              <a:buNone/>
+            </a:pPr>
+            <a:r>
+              <a:rPr lang="it-IT" dirty="0" smtClean="0"/>
+              <a:t>I dati che il programma richiede sono:</a:t>
             </a:r>
           </a:p>
           <a:p>
@@ -5669,16 +5676,9 @@
             </a:pPr>
             <a:r>
               <a:rPr lang="it-IT" dirty="0" smtClean="0"/>
-              <a:t>La tabella </a:t>
-            </a:r>
-            <a:r>
-              <a:rPr lang="it-IT" dirty="0" err="1" smtClean="0"/>
-              <a:t>orginale</a:t>
-            </a:r>
-            <a:r>
-              <a:rPr lang="it-IT" dirty="0" smtClean="0"/>
-              <a:t>, creata con i dati inseriti dall’utente</a:t>
-            </a:r>
+              <a:t>Il nodo d’origine</a:t>
+            </a:r>
+            <a:endParaRPr lang="it-IT" dirty="0" smtClean="0"/>
           </a:p>
           <a:p>
             <a:pPr>
@@ -5687,8 +5687,13 @@
             </a:pPr>
             <a:r>
               <a:rPr lang="it-IT" dirty="0" smtClean="0"/>
-              <a:t>La tabella intermedia, dove verranno eseguiti i calcoli sui collegamenti</a:t>
-            </a:r>
+              <a:t>Il nodo </a:t>
+            </a:r>
+            <a:r>
+              <a:rPr lang="it-IT" dirty="0" smtClean="0"/>
+              <a:t>di destinazione</a:t>
+            </a:r>
+            <a:endParaRPr lang="it-IT" dirty="0" smtClean="0"/>
           </a:p>
           <a:p>
             <a:pPr>
@@ -5697,15 +5702,78 @@
             </a:pPr>
             <a:r>
               <a:rPr lang="it-IT" dirty="0" smtClean="0"/>
-              <a:t>La tabella finale, contente il risultato finale che verrà mostrato all’utente</a:t>
-            </a:r>
-          </a:p>
-        </p:txBody>
-      </p:sp>
+              <a:t>Il costo del collegamento</a:t>
+            </a:r>
+          </a:p>
+        </p:txBody>
+      </p:sp>
+      <p:pic>
+        <p:nvPicPr>
+          <p:cNvPr id="5" name="Immagine 4"/>
+          <p:cNvPicPr>
+            <a:picLocks noChangeAspect="1"/>
+          </p:cNvPicPr>
+          <p:nvPr/>
+        </p:nvPicPr>
+        <p:blipFill>
+          <a:blip r:embed="rId2">
+            <a:extLst>
+              <a:ext uri="{28A0092B-C50C-407E-A947-70E740481C1C}">
+                <a14:useLocalDpi xmlns:a14="http://schemas.microsoft.com/office/drawing/2010/main" val="0"/>
+              </a:ext>
+            </a:extLst>
+          </a:blip>
+          <a:stretch>
+            <a:fillRect/>
+          </a:stretch>
+        </p:blipFill>
+        <p:spPr>
+          <a:xfrm>
+            <a:off x="6108595" y="3716647"/>
+            <a:ext cx="5128704" cy="1493649"/>
+          </a:xfrm>
+          <a:prstGeom prst="rect">
+            <a:avLst/>
+          </a:prstGeom>
+        </p:spPr>
+      </p:pic>
+      <p:cxnSp>
+        <p:nvCxnSpPr>
+          <p:cNvPr id="10" name="Connettore 2 9"/>
+          <p:cNvCxnSpPr/>
+          <p:nvPr/>
+        </p:nvCxnSpPr>
+        <p:spPr>
+          <a:xfrm>
+            <a:off x="9494982" y="1283350"/>
+            <a:ext cx="914400" cy="914400"/>
+          </a:xfrm>
+          <a:prstGeom prst="straightConnector1">
+            <a:avLst/>
+          </a:prstGeom>
+          <a:ln>
+            <a:tailEnd type="triangle"/>
+          </a:ln>
+        </p:spPr>
+        <p:style>
+          <a:lnRef idx="1">
+            <a:schemeClr val="accent1"/>
+          </a:lnRef>
+          <a:fillRef idx="0">
+            <a:schemeClr val="accent1"/>
+          </a:fillRef>
+          <a:effectRef idx="0">
+            <a:schemeClr val="accent1"/>
+          </a:effectRef>
+          <a:fontRef idx="minor">
+            <a:schemeClr val="tx1"/>
+          </a:fontRef>
+        </p:style>
+      </p:cxnSp>
     </p:spTree>
     <p:extLst>
       <p:ext uri="{BB962C8B-B14F-4D97-AF65-F5344CB8AC3E}">
-        <p14:creationId xmlns:p14="http://schemas.microsoft.com/office/powerpoint/2010/main" val="2625129020"/>
+        <p14:creationId xmlns:p14="http://schemas.microsoft.com/office/powerpoint/2010/main" val="842726148"/>
       </p:ext>
     </p:extLst>
   </p:cSld>
@@ -5767,84 +5835,15 @@
           </a:p>
         </p:txBody>
       </p:sp>
-      <p:sp>
-        <p:nvSpPr>
-          <p:cNvPr id="3" name="Segnaposto contenuto 2"/>
-          <p:cNvSpPr>
-            <a:spLocks noGrp="1"/>
-          </p:cNvSpPr>
-          <p:nvPr>
-            <p:ph idx="1"/>
-          </p:nvPr>
-        </p:nvSpPr>
-        <p:spPr>
-          <a:xfrm>
-            <a:off x="684212" y="2135909"/>
-            <a:ext cx="8534400" cy="3615267"/>
-          </a:xfrm>
-        </p:spPr>
-        <p:txBody>
-          <a:bodyPr anchor="t">
-            <a:normAutofit/>
-          </a:bodyPr>
-          <a:lstStyle/>
-          <a:p>
-            <a:pPr marL="0" indent="0">
-              <a:buNone/>
-            </a:pPr>
-            <a:r>
-              <a:rPr lang="it-IT" dirty="0" smtClean="0"/>
-              <a:t>Per creare la prima tabella occorre chiedere all’utente i dati dei vari nodi. </a:t>
-            </a:r>
-          </a:p>
-          <a:p>
-            <a:pPr marL="0" indent="0">
-              <a:buNone/>
-            </a:pPr>
-            <a:r>
-              <a:rPr lang="it-IT" dirty="0" smtClean="0"/>
-              <a:t>I dati che il programma richiede sono:</a:t>
-            </a:r>
-          </a:p>
-          <a:p>
-            <a:pPr>
-              <a:buFontTx/>
-              <a:buChar char="-"/>
-            </a:pPr>
-            <a:r>
-              <a:rPr lang="it-IT" dirty="0" smtClean="0"/>
-              <a:t>Il numero totale di nodi</a:t>
-            </a:r>
-          </a:p>
-          <a:p>
-            <a:pPr>
-              <a:buFontTx/>
-              <a:buChar char="-"/>
-            </a:pPr>
-            <a:r>
-              <a:rPr lang="it-IT" dirty="0" smtClean="0"/>
-              <a:t>Il nodo a cui è collegato ogni nodo (solo un collegamento)</a:t>
-            </a:r>
-          </a:p>
-          <a:p>
-            <a:pPr>
-              <a:buFontTx/>
-              <a:buChar char="-"/>
-            </a:pPr>
-            <a:r>
-              <a:rPr lang="it-IT" dirty="0" smtClean="0"/>
-              <a:t>Il costo del collegamento</a:t>
-            </a:r>
-          </a:p>
-        </p:txBody>
-      </p:sp>
       <p:pic>
         <p:nvPicPr>
-          <p:cNvPr id="4" name="Immagine 3"/>
+          <p:cNvPr id="7" name="Segnaposto contenuto 6"/>
           <p:cNvPicPr>
-            <a:picLocks noChangeAspect="1"/>
+            <a:picLocks noGrp="1" noChangeAspect="1"/>
           </p:cNvPicPr>
-          <p:nvPr/>
+          <p:nvPr>
+            <p:ph idx="1"/>
+          </p:nvPr>
         </p:nvPicPr>
         <p:blipFill>
           <a:blip r:embed="rId2">
@@ -5860,18 +5859,406 @@
         </p:blipFill>
         <p:spPr>
           <a:xfrm>
-            <a:off x="4486724" y="4340706"/>
-            <a:ext cx="6950042" cy="2179509"/>
+            <a:off x="1884733" y="2197750"/>
+            <a:ext cx="1403413" cy="1496976"/>
+          </a:xfrm>
+        </p:spPr>
+      </p:pic>
+      <p:sp>
+        <p:nvSpPr>
+          <p:cNvPr id="9" name="CasellaDiTesto 8"/>
+          <p:cNvSpPr txBox="1"/>
+          <p:nvPr/>
+        </p:nvSpPr>
+        <p:spPr>
+          <a:xfrm>
+            <a:off x="267853" y="2187458"/>
+            <a:ext cx="1316386" cy="276999"/>
           </a:xfrm>
           <a:prstGeom prst="rect">
             <a:avLst/>
           </a:prstGeom>
+          <a:noFill/>
+        </p:spPr>
+        <p:txBody>
+          <a:bodyPr wrap="none" rtlCol="0">
+            <a:spAutoFit/>
+          </a:bodyPr>
+          <a:lstStyle/>
+          <a:p>
+            <a:r>
+              <a:rPr lang="it-IT" sz="1200" dirty="0" smtClean="0"/>
+              <a:t>Nodo d’origine</a:t>
+            </a:r>
+            <a:endParaRPr lang="it-IT" sz="1200" dirty="0"/>
+          </a:p>
+        </p:txBody>
+      </p:sp>
+      <p:sp>
+        <p:nvSpPr>
+          <p:cNvPr id="12" name="CasellaDiTesto 11"/>
+          <p:cNvSpPr txBox="1"/>
+          <p:nvPr/>
+        </p:nvSpPr>
+        <p:spPr>
+          <a:xfrm>
+            <a:off x="1553782" y="1662682"/>
+            <a:ext cx="1768433" cy="276999"/>
+          </a:xfrm>
+          <a:prstGeom prst="rect">
+            <a:avLst/>
+          </a:prstGeom>
+          <a:noFill/>
+        </p:spPr>
+        <p:txBody>
+          <a:bodyPr wrap="none" rtlCol="0">
+            <a:spAutoFit/>
+          </a:bodyPr>
+          <a:lstStyle/>
+          <a:p>
+            <a:r>
+              <a:rPr lang="it-IT" sz="1200" dirty="0" smtClean="0"/>
+              <a:t>Nodo di destinazione</a:t>
+            </a:r>
+            <a:endParaRPr lang="it-IT" sz="1200" dirty="0"/>
+          </a:p>
+        </p:txBody>
+      </p:sp>
+      <p:sp>
+        <p:nvSpPr>
+          <p:cNvPr id="13" name="CasellaDiTesto 12"/>
+          <p:cNvSpPr txBox="1"/>
+          <p:nvPr/>
+        </p:nvSpPr>
+        <p:spPr>
+          <a:xfrm>
+            <a:off x="3341221" y="1939681"/>
+            <a:ext cx="623889" cy="276999"/>
+          </a:xfrm>
+          <a:prstGeom prst="rect">
+            <a:avLst/>
+          </a:prstGeom>
+          <a:noFill/>
+        </p:spPr>
+        <p:txBody>
+          <a:bodyPr wrap="none" rtlCol="0">
+            <a:spAutoFit/>
+          </a:bodyPr>
+          <a:lstStyle/>
+          <a:p>
+            <a:r>
+              <a:rPr lang="it-IT" sz="1200" dirty="0" smtClean="0"/>
+              <a:t>Costo</a:t>
+            </a:r>
+            <a:endParaRPr lang="it-IT" sz="1200" dirty="0"/>
+          </a:p>
+        </p:txBody>
+      </p:sp>
+      <p:cxnSp>
+        <p:nvCxnSpPr>
+          <p:cNvPr id="15" name="Connettore 2 14"/>
+          <p:cNvCxnSpPr>
+            <a:endCxn id="9" idx="3"/>
+          </p:cNvCxnSpPr>
+          <p:nvPr/>
+        </p:nvCxnSpPr>
+        <p:spPr>
+          <a:xfrm flipH="1">
+            <a:off x="1584239" y="2309091"/>
+            <a:ext cx="438525" cy="16867"/>
+          </a:xfrm>
+          <a:prstGeom prst="straightConnector1">
+            <a:avLst/>
+          </a:prstGeom>
+          <a:ln>
+            <a:tailEnd type="triangle"/>
+          </a:ln>
+        </p:spPr>
+        <p:style>
+          <a:lnRef idx="2">
+            <a:schemeClr val="dk1"/>
+          </a:lnRef>
+          <a:fillRef idx="0">
+            <a:schemeClr val="dk1"/>
+          </a:fillRef>
+          <a:effectRef idx="1">
+            <a:schemeClr val="dk1"/>
+          </a:effectRef>
+          <a:fontRef idx="minor">
+            <a:schemeClr val="tx1"/>
+          </a:fontRef>
+        </p:style>
+      </p:cxnSp>
+      <p:cxnSp>
+        <p:nvCxnSpPr>
+          <p:cNvPr id="18" name="Connettore 2 17"/>
+          <p:cNvCxnSpPr>
+            <a:endCxn id="12" idx="2"/>
+          </p:cNvCxnSpPr>
+          <p:nvPr/>
+        </p:nvCxnSpPr>
+        <p:spPr>
+          <a:xfrm flipV="1">
+            <a:off x="2437998" y="1939681"/>
+            <a:ext cx="1" cy="258069"/>
+          </a:xfrm>
+          <a:prstGeom prst="straightConnector1">
+            <a:avLst/>
+          </a:prstGeom>
+          <a:ln>
+            <a:tailEnd type="triangle"/>
+          </a:ln>
+        </p:spPr>
+        <p:style>
+          <a:lnRef idx="2">
+            <a:schemeClr val="dk1"/>
+          </a:lnRef>
+          <a:fillRef idx="0">
+            <a:schemeClr val="dk1"/>
+          </a:fillRef>
+          <a:effectRef idx="1">
+            <a:schemeClr val="dk1"/>
+          </a:effectRef>
+          <a:fontRef idx="minor">
+            <a:schemeClr val="tx1"/>
+          </a:fontRef>
+        </p:style>
+      </p:cxnSp>
+      <p:cxnSp>
+        <p:nvCxnSpPr>
+          <p:cNvPr id="21" name="Connettore 2 20"/>
+          <p:cNvCxnSpPr>
+            <a:endCxn id="13" idx="1"/>
+          </p:cNvCxnSpPr>
+          <p:nvPr/>
+        </p:nvCxnSpPr>
+        <p:spPr>
+          <a:xfrm flipV="1">
+            <a:off x="2881745" y="2078181"/>
+            <a:ext cx="459476" cy="138499"/>
+          </a:xfrm>
+          <a:prstGeom prst="straightConnector1">
+            <a:avLst/>
+          </a:prstGeom>
+          <a:ln>
+            <a:tailEnd type="triangle"/>
+          </a:ln>
+        </p:spPr>
+        <p:style>
+          <a:lnRef idx="2">
+            <a:schemeClr val="dk1"/>
+          </a:lnRef>
+          <a:fillRef idx="0">
+            <a:schemeClr val="dk1"/>
+          </a:fillRef>
+          <a:effectRef idx="1">
+            <a:schemeClr val="dk1"/>
+          </a:effectRef>
+          <a:fontRef idx="minor">
+            <a:schemeClr val="tx1"/>
+          </a:fontRef>
+        </p:style>
+      </p:cxnSp>
+      <p:sp>
+        <p:nvSpPr>
+          <p:cNvPr id="23" name="CasellaDiTesto 22"/>
+          <p:cNvSpPr txBox="1"/>
+          <p:nvPr/>
+        </p:nvSpPr>
+        <p:spPr>
+          <a:xfrm>
+            <a:off x="4632785" y="1916676"/>
+            <a:ext cx="3275256" cy="784830"/>
+          </a:xfrm>
+          <a:prstGeom prst="rect">
+            <a:avLst/>
+          </a:prstGeom>
+          <a:noFill/>
+        </p:spPr>
+        <p:txBody>
+          <a:bodyPr wrap="none" rtlCol="0">
+            <a:spAutoFit/>
+          </a:bodyPr>
+          <a:lstStyle/>
+          <a:p>
+            <a:r>
+              <a:rPr lang="it-IT" sz="1500" dirty="0" smtClean="0"/>
+              <a:t>Numero nodi = numero righe</a:t>
+            </a:r>
+          </a:p>
+          <a:p>
+            <a:endParaRPr lang="it-IT" sz="1500" dirty="0"/>
+          </a:p>
+          <a:p>
+            <a:r>
+              <a:rPr lang="it-IT" sz="1500" dirty="0" smtClean="0"/>
+              <a:t>Salvo collegamenti in una stringa</a:t>
+            </a:r>
+          </a:p>
+        </p:txBody>
+      </p:sp>
+      <p:cxnSp>
+        <p:nvCxnSpPr>
+          <p:cNvPr id="25" name="Connettore 2 24"/>
+          <p:cNvCxnSpPr/>
+          <p:nvPr/>
+        </p:nvCxnSpPr>
+        <p:spPr>
+          <a:xfrm flipV="1">
+            <a:off x="3534996" y="2464458"/>
+            <a:ext cx="880458" cy="167906"/>
+          </a:xfrm>
+          <a:prstGeom prst="straightConnector1">
+            <a:avLst/>
+          </a:prstGeom>
+          <a:ln>
+            <a:tailEnd type="triangle"/>
+          </a:ln>
+        </p:spPr>
+        <p:style>
+          <a:lnRef idx="2">
+            <a:schemeClr val="dk1"/>
+          </a:lnRef>
+          <a:fillRef idx="0">
+            <a:schemeClr val="dk1"/>
+          </a:fillRef>
+          <a:effectRef idx="1">
+            <a:schemeClr val="dk1"/>
+          </a:effectRef>
+          <a:fontRef idx="minor">
+            <a:schemeClr val="tx1"/>
+          </a:fontRef>
+        </p:style>
+      </p:cxnSp>
+      <p:pic>
+        <p:nvPicPr>
+          <p:cNvPr id="26" name="Immagine 25"/>
+          <p:cNvPicPr>
+            <a:picLocks noChangeAspect="1"/>
+          </p:cNvPicPr>
+          <p:nvPr/>
+        </p:nvPicPr>
+        <p:blipFill>
+          <a:blip r:embed="rId3">
+            <a:extLst>
+              <a:ext uri="{28A0092B-C50C-407E-A947-70E740481C1C}">
+                <a14:useLocalDpi xmlns:a14="http://schemas.microsoft.com/office/drawing/2010/main" val="0"/>
+              </a:ext>
+            </a:extLst>
+          </a:blip>
+          <a:stretch>
+            <a:fillRect/>
+          </a:stretch>
+        </p:blipFill>
+        <p:spPr>
+          <a:xfrm>
+            <a:off x="6501861" y="4833272"/>
+            <a:ext cx="5523661" cy="1747638"/>
+          </a:xfrm>
+          <a:prstGeom prst="rect">
+            <a:avLst/>
+          </a:prstGeom>
         </p:spPr>
       </p:pic>
+      <p:cxnSp>
+        <p:nvCxnSpPr>
+          <p:cNvPr id="28" name="Connettore 2 27"/>
+          <p:cNvCxnSpPr/>
+          <p:nvPr/>
+        </p:nvCxnSpPr>
+        <p:spPr>
+          <a:xfrm>
+            <a:off x="6057977" y="4331855"/>
+            <a:ext cx="1026314" cy="315647"/>
+          </a:xfrm>
+          <a:prstGeom prst="straightConnector1">
+            <a:avLst/>
+          </a:prstGeom>
+          <a:ln>
+            <a:tailEnd type="triangle"/>
+          </a:ln>
+        </p:spPr>
+        <p:style>
+          <a:lnRef idx="2">
+            <a:schemeClr val="dk1"/>
+          </a:lnRef>
+          <a:fillRef idx="0">
+            <a:schemeClr val="dk1"/>
+          </a:fillRef>
+          <a:effectRef idx="1">
+            <a:schemeClr val="dk1"/>
+          </a:effectRef>
+          <a:fontRef idx="minor">
+            <a:schemeClr val="tx1"/>
+          </a:fontRef>
+        </p:style>
+      </p:cxnSp>
+      <p:pic>
+        <p:nvPicPr>
+          <p:cNvPr id="31" name="Immagine 30"/>
+          <p:cNvPicPr>
+            <a:picLocks noChangeAspect="1"/>
+          </p:cNvPicPr>
+          <p:nvPr/>
+        </p:nvPicPr>
+        <p:blipFill rotWithShape="1">
+          <a:blip r:embed="rId4">
+            <a:extLst>
+              <a:ext uri="{28A0092B-C50C-407E-A947-70E740481C1C}">
+                <a14:useLocalDpi xmlns:a14="http://schemas.microsoft.com/office/drawing/2010/main" val="0"/>
+              </a:ext>
+            </a:extLst>
+          </a:blip>
+          <a:srcRect l="-1" r="45100"/>
+          <a:stretch/>
+        </p:blipFill>
+        <p:spPr>
+          <a:xfrm>
+            <a:off x="1169525" y="4000965"/>
+            <a:ext cx="4730942" cy="1955186"/>
+          </a:xfrm>
+          <a:prstGeom prst="rect">
+            <a:avLst/>
+          </a:prstGeom>
+        </p:spPr>
+      </p:pic>
+      <p:cxnSp>
+        <p:nvCxnSpPr>
+          <p:cNvPr id="35" name="Connettore 2 34"/>
+          <p:cNvCxnSpPr/>
+          <p:nvPr/>
+        </p:nvCxnSpPr>
+        <p:spPr>
+          <a:xfrm flipH="1">
+            <a:off x="3888509" y="2820014"/>
+            <a:ext cx="997530" cy="1062443"/>
+          </a:xfrm>
+          <a:prstGeom prst="straightConnector1">
+            <a:avLst/>
+          </a:prstGeom>
+          <a:ln>
+            <a:tailEnd type="triangle"/>
+          </a:ln>
+        </p:spPr>
+        <p:style>
+          <a:lnRef idx="2">
+            <a:schemeClr val="dk1"/>
+          </a:lnRef>
+          <a:fillRef idx="0">
+            <a:schemeClr val="dk1"/>
+          </a:fillRef>
+          <a:effectRef idx="1">
+            <a:schemeClr val="dk1"/>
+          </a:effectRef>
+          <a:fontRef idx="minor">
+            <a:schemeClr val="tx1"/>
+          </a:fontRef>
+        </p:style>
+      </p:cxnSp>
     </p:spTree>
     <p:extLst>
       <p:ext uri="{BB962C8B-B14F-4D97-AF65-F5344CB8AC3E}">
-        <p14:creationId xmlns:p14="http://schemas.microsoft.com/office/powerpoint/2010/main" val="842726148"/>
+        <p14:creationId xmlns:p14="http://schemas.microsoft.com/office/powerpoint/2010/main" val="918008287"/>
       </p:ext>
     </p:extLst>
   </p:cSld>
@@ -5960,16 +6347,15 @@
             </a:pPr>
             <a:r>
               <a:rPr lang="it-IT" dirty="0" smtClean="0"/>
-              <a:t>Dopo che abbiamo ottenuto la tabella originale, possiamo cominciare ad ordinare i collegamenti.</a:t>
-            </a:r>
-          </a:p>
-          <a:p>
-            <a:pPr marL="0" indent="0">
-              <a:buNone/>
-            </a:pPr>
+              <a:t>Dopo che abbiamo ottenuto la tabella originale, possiamo cominciare ad ordinare i </a:t>
+            </a:r>
             <a:r>
               <a:rPr lang="it-IT" dirty="0" smtClean="0"/>
-              <a:t>Le due tabelle successive vengono inizializzate:</a:t>
+              <a:t>collegamenti. Le </a:t>
+            </a:r>
+            <a:r>
+              <a:rPr lang="it-IT" dirty="0" smtClean="0"/>
+              <a:t>due tabelle successive vengono inizializzate:</a:t>
             </a:r>
           </a:p>
           <a:p>
@@ -5992,6 +6378,36 @@
           </a:p>
         </p:txBody>
       </p:sp>
+      <p:pic>
+        <p:nvPicPr>
+          <p:cNvPr id="4" name="Segnaposto contenuto 4"/>
+          <p:cNvPicPr>
+            <a:picLocks noChangeAspect="1"/>
+          </p:cNvPicPr>
+          <p:nvPr/>
+        </p:nvPicPr>
+        <p:blipFill>
+          <a:blip r:embed="rId2">
+            <a:extLst>
+              <a:ext uri="{28A0092B-C50C-407E-A947-70E740481C1C}">
+                <a14:useLocalDpi xmlns:a14="http://schemas.microsoft.com/office/drawing/2010/main" val="0"/>
+              </a:ext>
+            </a:extLst>
+          </a:blip>
+          <a:stretch>
+            <a:fillRect/>
+          </a:stretch>
+        </p:blipFill>
+        <p:spPr>
+          <a:xfrm>
+            <a:off x="2937165" y="4941749"/>
+            <a:ext cx="5399324" cy="1842360"/>
+          </a:xfrm>
+          <a:prstGeom prst="rect">
+            <a:avLst/>
+          </a:prstGeom>
+        </p:spPr>
+      </p:pic>
     </p:spTree>
     <p:extLst>
       <p:ext uri="{BB962C8B-B14F-4D97-AF65-F5344CB8AC3E}">
@@ -6057,15 +6473,64 @@
           </a:p>
         </p:txBody>
       </p:sp>
+      <p:sp>
+        <p:nvSpPr>
+          <p:cNvPr id="3" name="Segnaposto contenuto 2"/>
+          <p:cNvSpPr>
+            <a:spLocks noGrp="1"/>
+          </p:cNvSpPr>
+          <p:nvPr>
+            <p:ph idx="1"/>
+          </p:nvPr>
+        </p:nvSpPr>
+        <p:spPr>
+          <a:xfrm>
+            <a:off x="684212" y="1707188"/>
+            <a:ext cx="8534400" cy="3615267"/>
+          </a:xfrm>
+        </p:spPr>
+        <p:txBody>
+          <a:bodyPr anchor="t">
+            <a:normAutofit/>
+          </a:bodyPr>
+          <a:lstStyle/>
+          <a:p>
+            <a:pPr marL="0" indent="0">
+              <a:buNone/>
+            </a:pPr>
+            <a:r>
+              <a:rPr lang="it-IT" dirty="0" smtClean="0"/>
+              <a:t>Iniziamo ora ad ordinare i collegamenti:</a:t>
+            </a:r>
+          </a:p>
+          <a:p>
+            <a:pPr marL="0" indent="0">
+              <a:buNone/>
+            </a:pPr>
+            <a:r>
+              <a:rPr lang="it-IT" dirty="0" smtClean="0"/>
+              <a:t>Prendo i vari collegamenti e li comparo con la tabella di routing, se minore del costo attuale lo setto.</a:t>
+            </a:r>
+            <a:endParaRPr lang="it-IT" dirty="0" smtClean="0"/>
+          </a:p>
+          <a:p>
+            <a:pPr marL="0" indent="0">
+              <a:buNone/>
+            </a:pPr>
+            <a:r>
+              <a:rPr lang="it-IT" dirty="0" smtClean="0"/>
+              <a:t>Ripeto l’aggiornamento della tabella diverse volte (4 è il minimo) per ogni nodo, in modo da non avere incorrettezze.</a:t>
+            </a:r>
+          </a:p>
+        </p:txBody>
+      </p:sp>
       <p:pic>
         <p:nvPicPr>
-          <p:cNvPr id="5" name="Segnaposto contenuto 4"/>
+          <p:cNvPr id="5" name="Immagine 4"/>
           <p:cNvPicPr>
-            <a:picLocks noGrp="1" noChangeAspect="1"/>
+            <a:picLocks noChangeAspect="1"/>
           </p:cNvPicPr>
-          <p:nvPr>
-            <p:ph idx="1"/>
-          </p:nvPr>
+          <p:nvPr/>
         </p:nvPicPr>
         <p:blipFill>
           <a:blip r:embed="rId2">
@@ -6081,15 +6546,354 @@
         </p:blipFill>
         <p:spPr>
           <a:xfrm>
-            <a:off x="1162044" y="1966374"/>
-            <a:ext cx="9585135" cy="3270644"/>
-          </a:xfrm>
+            <a:off x="5375564" y="3679314"/>
+            <a:ext cx="6479924" cy="2383504"/>
+          </a:xfrm>
+          <a:prstGeom prst="rect">
+            <a:avLst/>
+          </a:prstGeom>
+        </p:spPr>
+      </p:pic>
+      <p:pic>
+        <p:nvPicPr>
+          <p:cNvPr id="6" name="Immagine 5"/>
+          <p:cNvPicPr>
+            <a:picLocks noChangeAspect="1"/>
+          </p:cNvPicPr>
+          <p:nvPr/>
+        </p:nvPicPr>
+        <p:blipFill>
+          <a:blip r:embed="rId3">
+            <a:extLst>
+              <a:ext uri="{28A0092B-C50C-407E-A947-70E740481C1C}">
+                <a14:useLocalDpi xmlns:a14="http://schemas.microsoft.com/office/drawing/2010/main" val="0"/>
+              </a:ext>
+            </a:extLst>
+          </a:blip>
+          <a:stretch>
+            <a:fillRect/>
+          </a:stretch>
+        </p:blipFill>
+        <p:spPr>
+          <a:xfrm>
+            <a:off x="745885" y="4325307"/>
+            <a:ext cx="3985605" cy="1737511"/>
+          </a:xfrm>
+          <a:prstGeom prst="rect">
+            <a:avLst/>
+          </a:prstGeom>
         </p:spPr>
       </p:pic>
     </p:spTree>
     <p:extLst>
       <p:ext uri="{BB962C8B-B14F-4D97-AF65-F5344CB8AC3E}">
-        <p14:creationId xmlns:p14="http://schemas.microsoft.com/office/powerpoint/2010/main" val="380498538"/>
+        <p14:creationId xmlns:p14="http://schemas.microsoft.com/office/powerpoint/2010/main" val="2799592481"/>
+      </p:ext>
+    </p:extLst>
+  </p:cSld>
+  <p:clrMapOvr>
+    <a:masterClrMapping/>
+  </p:clrMapOvr>
+  <p:timing>
+    <p:tnLst>
+      <p:par>
+        <p:cTn id="1" dur="indefinite" restart="never" nodeType="tmRoot"/>
+      </p:par>
+    </p:tnLst>
+  </p:timing>
+</p:sld>
+</file>
+
+<file path=ppt/slides/slide7.xml><?xml version="1.0" encoding="utf-8"?>
+<p:sld xmlns:a="http://schemas.openxmlformats.org/drawingml/2006/main" xmlns:r="http://schemas.openxmlformats.org/officeDocument/2006/relationships" xmlns:p="http://schemas.openxmlformats.org/presentationml/2006/main">
+  <p:cSld>
+    <p:spTree>
+      <p:nvGrpSpPr>
+        <p:cNvPr id="1" name=""/>
+        <p:cNvGrpSpPr/>
+        <p:nvPr/>
+      </p:nvGrpSpPr>
+      <p:grpSpPr>
+        <a:xfrm>
+          <a:off x="0" y="0"/>
+          <a:ext cx="0" cy="0"/>
+          <a:chOff x="0" y="0"/>
+          <a:chExt cx="0" cy="0"/>
+        </a:xfrm>
+      </p:grpSpPr>
+      <p:sp>
+        <p:nvSpPr>
+          <p:cNvPr id="2" name="Titolo 1"/>
+          <p:cNvSpPr>
+            <a:spLocks noGrp="1"/>
+          </p:cNvSpPr>
+          <p:nvPr>
+            <p:ph type="title"/>
+          </p:nvPr>
+        </p:nvSpPr>
+        <p:spPr>
+          <a:xfrm>
+            <a:off x="684212" y="340204"/>
+            <a:ext cx="8534400" cy="1507067"/>
+          </a:xfrm>
+        </p:spPr>
+        <p:txBody>
+          <a:bodyPr/>
+          <a:lstStyle/>
+          <a:p>
+            <a:r>
+              <a:rPr lang="it-IT" dirty="0" smtClean="0"/>
+              <a:t>La tabella finale</a:t>
+            </a:r>
+            <a:endParaRPr lang="it-IT" dirty="0"/>
+          </a:p>
+        </p:txBody>
+      </p:sp>
+      <p:sp>
+        <p:nvSpPr>
+          <p:cNvPr id="3" name="Segnaposto contenuto 2"/>
+          <p:cNvSpPr>
+            <a:spLocks noGrp="1"/>
+          </p:cNvSpPr>
+          <p:nvPr>
+            <p:ph idx="1"/>
+          </p:nvPr>
+        </p:nvSpPr>
+        <p:spPr>
+          <a:xfrm>
+            <a:off x="684212" y="2135909"/>
+            <a:ext cx="8534400" cy="3615267"/>
+          </a:xfrm>
+        </p:spPr>
+        <p:txBody>
+          <a:bodyPr anchor="t">
+            <a:normAutofit/>
+          </a:bodyPr>
+          <a:lstStyle/>
+          <a:p>
+            <a:pPr marL="0" indent="0">
+              <a:buNone/>
+            </a:pPr>
+            <a:r>
+              <a:rPr lang="it-IT" dirty="0" smtClean="0"/>
+              <a:t>Viene poi eseguito un </a:t>
+            </a:r>
+            <a:r>
+              <a:rPr lang="it-IT" dirty="0" err="1" smtClean="0"/>
+              <a:t>print</a:t>
+            </a:r>
+            <a:r>
+              <a:rPr lang="it-IT" dirty="0" smtClean="0"/>
+              <a:t> della tabella finale, mostrando i collegamenti con i costi minori per arrivare a ogni destinazione</a:t>
+            </a:r>
+            <a:endParaRPr lang="it-IT" dirty="0" smtClean="0"/>
+          </a:p>
+        </p:txBody>
+      </p:sp>
+      <p:pic>
+        <p:nvPicPr>
+          <p:cNvPr id="5" name="Immagine 4"/>
+          <p:cNvPicPr>
+            <a:picLocks noChangeAspect="1"/>
+          </p:cNvPicPr>
+          <p:nvPr/>
+        </p:nvPicPr>
+        <p:blipFill>
+          <a:blip r:embed="rId2">
+            <a:extLst>
+              <a:ext uri="{28A0092B-C50C-407E-A947-70E740481C1C}">
+                <a14:useLocalDpi xmlns:a14="http://schemas.microsoft.com/office/drawing/2010/main" val="0"/>
+              </a:ext>
+            </a:extLst>
+          </a:blip>
+          <a:stretch>
+            <a:fillRect/>
+          </a:stretch>
+        </p:blipFill>
+        <p:spPr>
+          <a:xfrm>
+            <a:off x="684212" y="2987164"/>
+            <a:ext cx="6782388" cy="2453853"/>
+          </a:xfrm>
+          <a:prstGeom prst="rect">
+            <a:avLst/>
+          </a:prstGeom>
+        </p:spPr>
+      </p:pic>
+      <p:pic>
+        <p:nvPicPr>
+          <p:cNvPr id="6" name="Immagine 5"/>
+          <p:cNvPicPr>
+            <a:picLocks noChangeAspect="1"/>
+          </p:cNvPicPr>
+          <p:nvPr/>
+        </p:nvPicPr>
+        <p:blipFill>
+          <a:blip r:embed="rId3">
+            <a:extLst>
+              <a:ext uri="{28A0092B-C50C-407E-A947-70E740481C1C}">
+                <a14:useLocalDpi xmlns:a14="http://schemas.microsoft.com/office/drawing/2010/main" val="0"/>
+              </a:ext>
+            </a:extLst>
+          </a:blip>
+          <a:stretch>
+            <a:fillRect/>
+          </a:stretch>
+        </p:blipFill>
+        <p:spPr>
+          <a:xfrm>
+            <a:off x="8525205" y="3383464"/>
+            <a:ext cx="2696728" cy="1668827"/>
+          </a:xfrm>
+          <a:prstGeom prst="rect">
+            <a:avLst/>
+          </a:prstGeom>
+        </p:spPr>
+      </p:pic>
+    </p:spTree>
+    <p:extLst>
+      <p:ext uri="{BB962C8B-B14F-4D97-AF65-F5344CB8AC3E}">
+        <p14:creationId xmlns:p14="http://schemas.microsoft.com/office/powerpoint/2010/main" val="3738030227"/>
+      </p:ext>
+    </p:extLst>
+  </p:cSld>
+  <p:clrMapOvr>
+    <a:masterClrMapping/>
+  </p:clrMapOvr>
+  <p:timing>
+    <p:tnLst>
+      <p:par>
+        <p:cTn id="1" dur="indefinite" restart="never" nodeType="tmRoot"/>
+      </p:par>
+    </p:tnLst>
+  </p:timing>
+</p:sld>
+</file>
+
+<file path=ppt/slides/slide8.xml><?xml version="1.0" encoding="utf-8"?>
+<p:sld xmlns:a="http://schemas.openxmlformats.org/drawingml/2006/main" xmlns:r="http://schemas.openxmlformats.org/officeDocument/2006/relationships" xmlns:p="http://schemas.openxmlformats.org/presentationml/2006/main">
+  <p:cSld>
+    <p:spTree>
+      <p:nvGrpSpPr>
+        <p:cNvPr id="1" name=""/>
+        <p:cNvGrpSpPr/>
+        <p:nvPr/>
+      </p:nvGrpSpPr>
+      <p:grpSpPr>
+        <a:xfrm>
+          <a:off x="0" y="0"/>
+          <a:ext cx="0" cy="0"/>
+          <a:chOff x="0" y="0"/>
+          <a:chExt cx="0" cy="0"/>
+        </a:xfrm>
+      </p:grpSpPr>
+      <p:sp>
+        <p:nvSpPr>
+          <p:cNvPr id="2" name="Titolo 1"/>
+          <p:cNvSpPr>
+            <a:spLocks noGrp="1"/>
+          </p:cNvSpPr>
+          <p:nvPr>
+            <p:ph type="title"/>
+          </p:nvPr>
+        </p:nvSpPr>
+        <p:spPr>
+          <a:xfrm>
+            <a:off x="684212" y="340204"/>
+            <a:ext cx="8534400" cy="1507067"/>
+          </a:xfrm>
+        </p:spPr>
+        <p:txBody>
+          <a:bodyPr/>
+          <a:lstStyle/>
+          <a:p>
+            <a:r>
+              <a:rPr lang="it-IT" dirty="0"/>
+              <a:t>Funzionalità </a:t>
+            </a:r>
+            <a:r>
+              <a:rPr lang="it-IT" dirty="0" err="1" smtClean="0"/>
+              <a:t>MancatE</a:t>
+            </a:r>
+            <a:endParaRPr lang="it-IT" dirty="0"/>
+          </a:p>
+        </p:txBody>
+      </p:sp>
+      <p:sp>
+        <p:nvSpPr>
+          <p:cNvPr id="3" name="Segnaposto contenuto 2"/>
+          <p:cNvSpPr>
+            <a:spLocks noGrp="1"/>
+          </p:cNvSpPr>
+          <p:nvPr>
+            <p:ph idx="1"/>
+          </p:nvPr>
+        </p:nvSpPr>
+        <p:spPr>
+          <a:xfrm>
+            <a:off x="277812" y="3318164"/>
+            <a:ext cx="8534400" cy="782782"/>
+          </a:xfrm>
+        </p:spPr>
+        <p:txBody>
+          <a:bodyPr anchor="t">
+            <a:normAutofit/>
+          </a:bodyPr>
+          <a:lstStyle/>
+          <a:p>
+            <a:pPr>
+              <a:buFontTx/>
+              <a:buChar char="-"/>
+            </a:pPr>
+            <a:r>
+              <a:rPr lang="it-IT" dirty="0" smtClean="0"/>
+              <a:t>Salvataggio su </a:t>
+            </a:r>
+            <a:r>
+              <a:rPr lang="it-IT" dirty="0" err="1" smtClean="0"/>
+              <a:t>json</a:t>
+            </a:r>
+            <a:r>
+              <a:rPr lang="it-IT" dirty="0" smtClean="0"/>
+              <a:t>, salvando ogni colonna della tabella in un vettore, unendoli poi in file d’output.</a:t>
+            </a:r>
+          </a:p>
+        </p:txBody>
+      </p:sp>
+      <p:pic>
+        <p:nvPicPr>
+          <p:cNvPr id="5" name="Immagine 4"/>
+          <p:cNvPicPr>
+            <a:picLocks noChangeAspect="1"/>
+          </p:cNvPicPr>
+          <p:nvPr/>
+        </p:nvPicPr>
+        <p:blipFill>
+          <a:blip r:embed="rId2">
+            <a:extLst>
+              <a:ext uri="{28A0092B-C50C-407E-A947-70E740481C1C}">
+                <a14:useLocalDpi xmlns:a14="http://schemas.microsoft.com/office/drawing/2010/main" val="0"/>
+              </a:ext>
+            </a:extLst>
+          </a:blip>
+          <a:stretch>
+            <a:fillRect/>
+          </a:stretch>
+        </p:blipFill>
+        <p:spPr>
+          <a:xfrm>
+            <a:off x="8812212" y="2021924"/>
+            <a:ext cx="1119027" cy="3988789"/>
+          </a:xfrm>
+          <a:prstGeom prst="rect">
+            <a:avLst/>
+          </a:prstGeom>
+        </p:spPr>
+      </p:pic>
+    </p:spTree>
+    <p:extLst>
+      <p:ext uri="{BB962C8B-B14F-4D97-AF65-F5344CB8AC3E}">
+        <p14:creationId xmlns:p14="http://schemas.microsoft.com/office/powerpoint/2010/main" val="3005795893"/>
       </p:ext>
     </p:extLst>
   </p:cSld>

</xml_diff>